<commit_message>
Update Halil ABP Community Talks 2022.3.pptx
</commit_message>
<xml_diff>
--- a/2022-04-07 ABP Community Talks 2022.3/Halil ABP Community Talks 2022.3.pptx
+++ b/2022-04-07 ABP Community Talks 2022.3/Halil ABP Community Talks 2022.3.pptx
@@ -12,12 +12,17 @@
     <p:sldId id="274" r:id="rId6"/>
     <p:sldId id="275" r:id="rId7"/>
     <p:sldId id="292" r:id="rId8"/>
-    <p:sldId id="287" r:id="rId9"/>
-    <p:sldId id="288" r:id="rId10"/>
-    <p:sldId id="270" r:id="rId11"/>
-    <p:sldId id="289" r:id="rId12"/>
-    <p:sldId id="290" r:id="rId13"/>
-    <p:sldId id="291" r:id="rId14"/>
+    <p:sldId id="293" r:id="rId9"/>
+    <p:sldId id="289" r:id="rId10"/>
+    <p:sldId id="287" r:id="rId11"/>
+    <p:sldId id="295" r:id="rId12"/>
+    <p:sldId id="288" r:id="rId13"/>
+    <p:sldId id="294" r:id="rId14"/>
+    <p:sldId id="298" r:id="rId15"/>
+    <p:sldId id="290" r:id="rId16"/>
+    <p:sldId id="291" r:id="rId17"/>
+    <p:sldId id="296" r:id="rId18"/>
+    <p:sldId id="297" r:id="rId19"/>
   </p:sldIdLst>
   <p:sldSz cx="12192000" cy="6858000"/>
   <p:notesSz cx="6858000" cy="9144000"/>
@@ -3461,100 +3466,79 @@
           <p:cNvPr id="2" name="Title 1">
             <a:extLst>
               <a:ext uri="{FF2B5EF4-FFF2-40B4-BE49-F238E27FC236}">
-                <a16:creationId xmlns:a16="http://schemas.microsoft.com/office/drawing/2014/main" id="{9255DFBE-19DA-408D-84E6-F4043FC30BD3}"/>
-              </a:ext>
-            </a:extLst>
-          </p:cNvPr>
-          <p:cNvSpPr>
-            <a:spLocks noGrp="1"/>
-          </p:cNvSpPr>
-          <p:nvPr>
-            <p:ph type="ctrTitle"/>
+                <a16:creationId xmlns:a16="http://schemas.microsoft.com/office/drawing/2014/main" id="{55E11F08-6CA0-48F1-AD67-97430DDA07F0}"/>
+              </a:ext>
+            </a:extLst>
+          </p:cNvPr>
+          <p:cNvSpPr>
+            <a:spLocks noGrp="1"/>
+          </p:cNvSpPr>
+          <p:nvPr>
+            <p:ph type="title"/>
           </p:nvPr>
         </p:nvSpPr>
         <p:spPr/>
         <p:txBody>
-          <a:bodyPr>
-            <a:normAutofit/>
-          </a:bodyPr>
+          <a:bodyPr/>
           <a:lstStyle/>
           <a:p>
             <a:r>
-              <a:rPr lang="en-US" sz="4800" b="1" dirty="0">
+              <a:rPr lang="en-US" b="1" dirty="0">
                 <a:solidFill>
                   <a:srgbClr val="292D33"/>
                 </a:solidFill>
                 <a:latin typeface="Euclid Circular B" panose="020B0504000000000000" pitchFamily="34" charset="0"/>
                 <a:ea typeface="Euclid Circular B" panose="020B0504000000000000" pitchFamily="34" charset="0"/>
               </a:rPr>
-              <a:t>DESIGNING</a:t>
-            </a:r>
-            <a:br>
-              <a:rPr lang="en-US" sz="4800" b="1" dirty="0">
+              <a:t>EventHub</a:t>
+            </a:r>
+            <a:r>
+              <a:rPr lang="en-US" dirty="0">
                 <a:solidFill>
                   <a:srgbClr val="292D33"/>
                 </a:solidFill>
                 <a:latin typeface="Euclid Circular B" panose="020B0504000000000000" pitchFamily="34" charset="0"/>
                 <a:ea typeface="Euclid Circular B" panose="020B0504000000000000" pitchFamily="34" charset="0"/>
               </a:rPr>
-            </a:br>
-            <a:r>
-              <a:rPr lang="en-US" sz="4800" b="1" dirty="0">
-                <a:solidFill>
-                  <a:srgbClr val="292D33"/>
-                </a:solidFill>
-                <a:latin typeface="Euclid Circular B" panose="020B0504000000000000" pitchFamily="34" charset="0"/>
-                <a:ea typeface="Euclid Circular B" panose="020B0504000000000000" pitchFamily="34" charset="0"/>
-              </a:rPr>
-              <a:t>A MODULAR MONOLITH</a:t>
-            </a:r>
-          </a:p>
-        </p:txBody>
-      </p:sp>
-      <p:sp>
-        <p:nvSpPr>
-          <p:cNvPr id="3" name="Subtitle 2">
-            <a:extLst>
-              <a:ext uri="{FF2B5EF4-FFF2-40B4-BE49-F238E27FC236}">
-                <a16:creationId xmlns:a16="http://schemas.microsoft.com/office/drawing/2014/main" id="{265612B9-B745-46CB-8A20-997CA82E05E7}"/>
-              </a:ext>
-            </a:extLst>
-          </p:cNvPr>
-          <p:cNvSpPr>
-            <a:spLocks noGrp="1"/>
-          </p:cNvSpPr>
-          <p:nvPr>
-            <p:ph type="subTitle" idx="1"/>
-          </p:nvPr>
-        </p:nvSpPr>
-        <p:spPr/>
-        <p:txBody>
-          <a:bodyPr>
-            <a:normAutofit/>
-          </a:bodyPr>
-          <a:lstStyle/>
-          <a:p>
-            <a:r>
-              <a:rPr lang="en-US" sz="2000" b="1" dirty="0">
-                <a:solidFill>
-                  <a:srgbClr val="292D33"/>
-                </a:solidFill>
-                <a:latin typeface="Euclid Circular B" panose="020B0504000000000000" pitchFamily="34" charset="0"/>
-                <a:ea typeface="Euclid Circular B" panose="020B0504000000000000" pitchFamily="34" charset="0"/>
-              </a:rPr>
-              <a:t>DESIGNING MONOLITH FIRST FOR MICROSERVICE ARCHITECTURE</a:t>
-            </a:r>
-            <a:endParaRPr lang="en-US" sz="2000" dirty="0">
-              <a:latin typeface="Euclid Circular B" panose="020B0504000000000000" pitchFamily="34" charset="0"/>
-              <a:ea typeface="Euclid Circular B" panose="020B0504000000000000" pitchFamily="34" charset="0"/>
-            </a:endParaRPr>
-          </a:p>
-        </p:txBody>
-      </p:sp>
+              <a:t>: The application</a:t>
+            </a:r>
+          </a:p>
+        </p:txBody>
+      </p:sp>
+      <p:pic>
+        <p:nvPicPr>
+          <p:cNvPr id="6" name="Picture 5" descr="Graphical user interface, website&#10;&#10;Description automatically generated">
+            <a:extLst>
+              <a:ext uri="{FF2B5EF4-FFF2-40B4-BE49-F238E27FC236}">
+                <a16:creationId xmlns:a16="http://schemas.microsoft.com/office/drawing/2014/main" id="{D852FB9C-9C5D-446C-BC10-39E888DDE0CF}"/>
+              </a:ext>
+            </a:extLst>
+          </p:cNvPr>
+          <p:cNvPicPr>
+            <a:picLocks noChangeAspect="1"/>
+          </p:cNvPicPr>
+          <p:nvPr/>
+        </p:nvPicPr>
+        <p:blipFill>
+          <a:blip r:embed="rId3"/>
+          <a:stretch>
+            <a:fillRect/>
+          </a:stretch>
+        </p:blipFill>
+        <p:spPr>
+          <a:xfrm>
+            <a:off x="2722126" y="1388330"/>
+            <a:ext cx="6747748" cy="5104545"/>
+          </a:xfrm>
+          <a:prstGeom prst="rect">
+            <a:avLst/>
+          </a:prstGeom>
+        </p:spPr>
+      </p:pic>
     </p:spTree>
     <p:extLst>
       <p:ext uri="{BB962C8B-B14F-4D97-AF65-F5344CB8AC3E}">
-        <p14:creationId xmlns:p14="http://schemas.microsoft.com/office/powerpoint/2010/main" val="3204605943"/>
+        <p14:creationId xmlns:p14="http://schemas.microsoft.com/office/powerpoint/2010/main" val="1699722907"/>
       </p:ext>
     </p:extLst>
   </p:cSld>
@@ -3624,64 +3608,55 @@
                 <a:latin typeface="Euclid Circular B" panose="020B0504000000000000" pitchFamily="34" charset="0"/>
                 <a:ea typeface="Euclid Circular B" panose="020B0504000000000000" pitchFamily="34" charset="0"/>
               </a:rPr>
-              <a:t>Title</a:t>
-            </a:r>
-            <a:endParaRPr lang="en-US" dirty="0">
-              <a:solidFill>
-                <a:srgbClr val="292D33"/>
-              </a:solidFill>
-              <a:latin typeface="Euclid Circular B" panose="020B0504000000000000" pitchFamily="34" charset="0"/>
-              <a:ea typeface="Euclid Circular B" panose="020B0504000000000000" pitchFamily="34" charset="0"/>
-            </a:endParaRPr>
-          </a:p>
-        </p:txBody>
-      </p:sp>
-      <p:sp>
-        <p:nvSpPr>
-          <p:cNvPr id="3" name="Content Placeholder 2">
-            <a:extLst>
-              <a:ext uri="{FF2B5EF4-FFF2-40B4-BE49-F238E27FC236}">
-                <a16:creationId xmlns:a16="http://schemas.microsoft.com/office/drawing/2014/main" id="{891C7693-D3DF-4635-96F4-97F3B4136FDF}"/>
-              </a:ext>
-            </a:extLst>
-          </p:cNvPr>
-          <p:cNvSpPr>
-            <a:spLocks noGrp="1"/>
-          </p:cNvSpPr>
-          <p:nvPr>
-            <p:ph idx="1"/>
-          </p:nvPr>
-        </p:nvSpPr>
-        <p:spPr/>
-        <p:txBody>
-          <a:bodyPr/>
-          <a:lstStyle/>
-          <a:p>
+              <a:t>EventHub</a:t>
+            </a:r>
             <a:r>
               <a:rPr lang="en-US" dirty="0">
-                <a:latin typeface="Euclid Circular B" panose="020B0504000000000000" pitchFamily="34" charset="0"/>
-                <a:ea typeface="Euclid Circular B" panose="020B0504000000000000" pitchFamily="34" charset="0"/>
-              </a:rPr>
-              <a:t>TODO</a:t>
-            </a:r>
-            <a:r>
-              <a:rPr lang="en-US">
-                <a:latin typeface="Euclid Circular B" panose="020B0504000000000000" pitchFamily="34" charset="0"/>
-                <a:ea typeface="Euclid Circular B" panose="020B0504000000000000" pitchFamily="34" charset="0"/>
-              </a:rPr>
-              <a:t>: ...</a:t>
-            </a:r>
-            <a:endParaRPr lang="en-US" dirty="0">
-              <a:latin typeface="Euclid Circular B" panose="020B0504000000000000" pitchFamily="34" charset="0"/>
-              <a:ea typeface="Euclid Circular B" panose="020B0504000000000000" pitchFamily="34" charset="0"/>
-            </a:endParaRPr>
-          </a:p>
-        </p:txBody>
-      </p:sp>
+                <a:solidFill>
+                  <a:srgbClr val="292D33"/>
+                </a:solidFill>
+                <a:latin typeface="Euclid Circular B" panose="020B0504000000000000" pitchFamily="34" charset="0"/>
+                <a:ea typeface="Euclid Circular B" panose="020B0504000000000000" pitchFamily="34" charset="0"/>
+              </a:rPr>
+              <a:t>: The application</a:t>
+            </a:r>
+          </a:p>
+        </p:txBody>
+      </p:sp>
+      <p:pic>
+        <p:nvPicPr>
+          <p:cNvPr id="4" name="Picture 3">
+            <a:extLst>
+              <a:ext uri="{FF2B5EF4-FFF2-40B4-BE49-F238E27FC236}">
+                <a16:creationId xmlns:a16="http://schemas.microsoft.com/office/drawing/2014/main" id="{CAE06C68-D404-4819-A93C-F12165091A4F}"/>
+              </a:ext>
+            </a:extLst>
+          </p:cNvPr>
+          <p:cNvPicPr>
+            <a:picLocks noChangeAspect="1"/>
+          </p:cNvPicPr>
+          <p:nvPr/>
+        </p:nvPicPr>
+        <p:blipFill>
+          <a:blip r:embed="rId3"/>
+          <a:stretch>
+            <a:fillRect/>
+          </a:stretch>
+        </p:blipFill>
+        <p:spPr>
+          <a:xfrm>
+            <a:off x="3230245" y="1365885"/>
+            <a:ext cx="5731510" cy="5126990"/>
+          </a:xfrm>
+          <a:prstGeom prst="rect">
+            <a:avLst/>
+          </a:prstGeom>
+        </p:spPr>
+      </p:pic>
     </p:spTree>
     <p:extLst>
       <p:ext uri="{BB962C8B-B14F-4D97-AF65-F5344CB8AC3E}">
-        <p14:creationId xmlns:p14="http://schemas.microsoft.com/office/powerpoint/2010/main" val="988782490"/>
+        <p14:creationId xmlns:p14="http://schemas.microsoft.com/office/powerpoint/2010/main" val="2853579536"/>
       </p:ext>
     </p:extLst>
   </p:cSld>
@@ -3751,24 +3726,57 @@
                 <a:latin typeface="Euclid Circular B" panose="020B0504000000000000" pitchFamily="34" charset="0"/>
                 <a:ea typeface="Euclid Circular B" panose="020B0504000000000000" pitchFamily="34" charset="0"/>
               </a:rPr>
-              <a:t>Title</a:t>
-            </a:r>
-            <a:endParaRPr lang="en-US" dirty="0">
-              <a:solidFill>
-                <a:srgbClr val="292D33"/>
-              </a:solidFill>
-              <a:latin typeface="Euclid Circular B" panose="020B0504000000000000" pitchFamily="34" charset="0"/>
-              <a:ea typeface="Euclid Circular B" panose="020B0504000000000000" pitchFamily="34" charset="0"/>
-            </a:endParaRPr>
-          </a:p>
-        </p:txBody>
-      </p:sp>
-      <p:sp>
-        <p:nvSpPr>
-          <p:cNvPr id="3" name="Content Placeholder 2">
-            <a:extLst>
-              <a:ext uri="{FF2B5EF4-FFF2-40B4-BE49-F238E27FC236}">
-                <a16:creationId xmlns:a16="http://schemas.microsoft.com/office/drawing/2014/main" id="{891C7693-D3DF-4635-96F4-97F3B4136FDF}"/>
+              <a:t>EventHub</a:t>
+            </a:r>
+            <a:r>
+              <a:rPr lang="en-US" dirty="0">
+                <a:solidFill>
+                  <a:srgbClr val="292D33"/>
+                </a:solidFill>
+                <a:latin typeface="Euclid Circular B" panose="020B0504000000000000" pitchFamily="34" charset="0"/>
+                <a:ea typeface="Euclid Circular B" panose="020B0504000000000000" pitchFamily="34" charset="0"/>
+              </a:rPr>
+              <a:t>: The architecture</a:t>
+            </a:r>
+          </a:p>
+        </p:txBody>
+      </p:sp>
+      <p:pic>
+        <p:nvPicPr>
+          <p:cNvPr id="7" name="Picture 6">
+            <a:extLst>
+              <a:ext uri="{FF2B5EF4-FFF2-40B4-BE49-F238E27FC236}">
+                <a16:creationId xmlns:a16="http://schemas.microsoft.com/office/drawing/2014/main" id="{F5AAF6BC-05CF-4DB3-AE20-2E897DD5FE08}"/>
+              </a:ext>
+            </a:extLst>
+          </p:cNvPr>
+          <p:cNvPicPr>
+            <a:picLocks noChangeAspect="1"/>
+          </p:cNvPicPr>
+          <p:nvPr/>
+        </p:nvPicPr>
+        <p:blipFill>
+          <a:blip r:embed="rId3"/>
+          <a:stretch>
+            <a:fillRect/>
+          </a:stretch>
+        </p:blipFill>
+        <p:spPr>
+          <a:xfrm>
+            <a:off x="5854045" y="1426737"/>
+            <a:ext cx="6022083" cy="4606417"/>
+          </a:xfrm>
+          <a:prstGeom prst="rect">
+            <a:avLst/>
+          </a:prstGeom>
+        </p:spPr>
+      </p:pic>
+      <p:sp>
+        <p:nvSpPr>
+          <p:cNvPr id="8" name="Content Placeholder 2">
+            <a:extLst>
+              <a:ext uri="{FF2B5EF4-FFF2-40B4-BE49-F238E27FC236}">
+                <a16:creationId xmlns:a16="http://schemas.microsoft.com/office/drawing/2014/main" id="{22E85D3D-C50F-4A91-9B44-66DF397ED0E5}"/>
               </a:ext>
             </a:extLst>
           </p:cNvPr>
@@ -3779,42 +3787,495 @@
             <p:ph idx="1"/>
           </p:nvPr>
         </p:nvSpPr>
-        <p:spPr/>
-        <p:txBody>
-          <a:bodyPr/>
+        <p:spPr>
+          <a:xfrm>
+            <a:off x="838200" y="1825625"/>
+            <a:ext cx="5015845" cy="4351338"/>
+          </a:xfrm>
+        </p:spPr>
+        <p:txBody>
+          <a:bodyPr>
+            <a:normAutofit/>
+          </a:bodyPr>
           <a:lstStyle/>
           <a:p>
             <a:r>
-              <a:rPr lang="en-US" dirty="0">
-                <a:latin typeface="Euclid Circular B" panose="020B0504000000000000" pitchFamily="34" charset="0"/>
-                <a:ea typeface="Euclid Circular B" panose="020B0504000000000000" pitchFamily="34" charset="0"/>
-              </a:rPr>
-              <a:t>TODO</a:t>
-            </a:r>
-            <a:r>
-              <a:rPr lang="en-US">
-                <a:latin typeface="Euclid Circular B" panose="020B0504000000000000" pitchFamily="34" charset="0"/>
-                <a:ea typeface="Euclid Circular B" panose="020B0504000000000000" pitchFamily="34" charset="0"/>
-              </a:rPr>
-              <a:t>: ...</a:t>
-            </a:r>
-            <a:endParaRPr lang="en-US" dirty="0">
-              <a:latin typeface="Euclid Circular B" panose="020B0504000000000000" pitchFamily="34" charset="0"/>
-              <a:ea typeface="Euclid Circular B" panose="020B0504000000000000" pitchFamily="34" charset="0"/>
-            </a:endParaRPr>
+              <a:rPr lang="en-US" sz="2400" dirty="0">
+                <a:latin typeface="Euclid Circular B" panose="020B0504000000000000" pitchFamily="34" charset="0"/>
+                <a:ea typeface="Euclid Circular B" panose="020B0504000000000000" pitchFamily="34" charset="0"/>
+              </a:rPr>
+              <a:t>Two web applications:</a:t>
+            </a:r>
+          </a:p>
+          <a:p>
+            <a:pPr lvl="1"/>
+            <a:r>
+              <a:rPr lang="en-US" sz="2000" dirty="0">
+                <a:latin typeface="Euclid Circular B" panose="020B0504000000000000" pitchFamily="34" charset="0"/>
+                <a:ea typeface="Euclid Circular B" panose="020B0504000000000000" pitchFamily="34" charset="0"/>
+              </a:rPr>
+              <a:t>Main website (Razor Pages)</a:t>
+            </a:r>
+          </a:p>
+          <a:p>
+            <a:pPr lvl="1"/>
+            <a:r>
+              <a:rPr lang="en-US" sz="2000" dirty="0">
+                <a:latin typeface="Euclid Circular B" panose="020B0504000000000000" pitchFamily="34" charset="0"/>
+                <a:ea typeface="Euclid Circular B" panose="020B0504000000000000" pitchFamily="34" charset="0"/>
+              </a:rPr>
+              <a:t>Admin application (</a:t>
+            </a:r>
+            <a:r>
+              <a:rPr lang="en-US" sz="2000" dirty="0" err="1">
+                <a:latin typeface="Euclid Circular B" panose="020B0504000000000000" pitchFamily="34" charset="0"/>
+                <a:ea typeface="Euclid Circular B" panose="020B0504000000000000" pitchFamily="34" charset="0"/>
+              </a:rPr>
+              <a:t>Blazor</a:t>
+            </a:r>
+            <a:r>
+              <a:rPr lang="en-US" sz="2000" dirty="0">
+                <a:latin typeface="Euclid Circular B" panose="020B0504000000000000" pitchFamily="34" charset="0"/>
+                <a:ea typeface="Euclid Circular B" panose="020B0504000000000000" pitchFamily="34" charset="0"/>
+              </a:rPr>
+              <a:t> WASM)</a:t>
+            </a:r>
+          </a:p>
+          <a:p>
+            <a:r>
+              <a:rPr lang="en-US" sz="2400" dirty="0">
+                <a:latin typeface="Euclid Circular B" panose="020B0504000000000000" pitchFamily="34" charset="0"/>
+                <a:ea typeface="Euclid Circular B" panose="020B0504000000000000" pitchFamily="34" charset="0"/>
+              </a:rPr>
+              <a:t>Authentication server (built with the IdentityServer4)</a:t>
+            </a:r>
+          </a:p>
+          <a:p>
+            <a:r>
+              <a:rPr lang="en-US" sz="2400" dirty="0">
+                <a:latin typeface="Euclid Circular B" panose="020B0504000000000000" pitchFamily="34" charset="0"/>
+                <a:ea typeface="Euclid Circular B" panose="020B0504000000000000" pitchFamily="34" charset="0"/>
+              </a:rPr>
+              <a:t>Two API endpoints (one for each web application)</a:t>
+            </a:r>
+          </a:p>
+          <a:p>
+            <a:r>
+              <a:rPr lang="en-US" sz="2400" dirty="0">
+                <a:latin typeface="Euclid Circular B" panose="020B0504000000000000" pitchFamily="34" charset="0"/>
+                <a:ea typeface="Euclid Circular B" panose="020B0504000000000000" pitchFamily="34" charset="0"/>
+              </a:rPr>
+              <a:t>Background service (console application)</a:t>
+            </a:r>
           </a:p>
         </p:txBody>
       </p:sp>
     </p:spTree>
     <p:extLst>
       <p:ext uri="{BB962C8B-B14F-4D97-AF65-F5344CB8AC3E}">
-        <p14:creationId xmlns:p14="http://schemas.microsoft.com/office/powerpoint/2010/main" val="840977384"/>
+        <p14:creationId xmlns:p14="http://schemas.microsoft.com/office/powerpoint/2010/main" val="2800787200"/>
       </p:ext>
     </p:extLst>
   </p:cSld>
   <p:clrMapOvr>
     <a:masterClrMapping/>
   </p:clrMapOvr>
+  <p:timing>
+    <p:tnLst>
+      <p:par>
+        <p:cTn id="1" dur="indefinite" restart="never" nodeType="tmRoot">
+          <p:childTnLst>
+            <p:seq concurrent="1" nextAc="seek">
+              <p:cTn id="2" dur="indefinite" nodeType="mainSeq">
+                <p:childTnLst>
+                  <p:par>
+                    <p:cTn id="3" fill="hold">
+                      <p:stCondLst>
+                        <p:cond delay="indefinite"/>
+                      </p:stCondLst>
+                      <p:childTnLst>
+                        <p:par>
+                          <p:cTn id="4" fill="hold">
+                            <p:stCondLst>
+                              <p:cond delay="0"/>
+                            </p:stCondLst>
+                            <p:childTnLst>
+                              <p:par>
+                                <p:cTn id="5" presetID="10" presetClass="entr" presetSubtype="0" fill="hold" nodeType="clickEffect">
+                                  <p:stCondLst>
+                                    <p:cond delay="0"/>
+                                  </p:stCondLst>
+                                  <p:childTnLst>
+                                    <p:set>
+                                      <p:cBhvr>
+                                        <p:cTn id="6" dur="1" fill="hold">
+                                          <p:stCondLst>
+                                            <p:cond delay="0"/>
+                                          </p:stCondLst>
+                                        </p:cTn>
+                                        <p:tgtEl>
+                                          <p:spTgt spid="8">
+                                            <p:txEl>
+                                              <p:pRg st="0" end="0"/>
+                                            </p:txEl>
+                                          </p:spTgt>
+                                        </p:tgtEl>
+                                        <p:attrNameLst>
+                                          <p:attrName>style.visibility</p:attrName>
+                                        </p:attrNameLst>
+                                      </p:cBhvr>
+                                      <p:to>
+                                        <p:strVal val="visible"/>
+                                      </p:to>
+                                    </p:set>
+                                    <p:animEffect transition="in" filter="fade">
+                                      <p:cBhvr>
+                                        <p:cTn id="7" dur="500"/>
+                                        <p:tgtEl>
+                                          <p:spTgt spid="8">
+                                            <p:txEl>
+                                              <p:pRg st="0" end="0"/>
+                                            </p:txEl>
+                                          </p:spTgt>
+                                        </p:tgtEl>
+                                      </p:cBhvr>
+                                    </p:animEffect>
+                                  </p:childTnLst>
+                                </p:cTn>
+                              </p:par>
+                            </p:childTnLst>
+                          </p:cTn>
+                        </p:par>
+                      </p:childTnLst>
+                    </p:cTn>
+                  </p:par>
+                  <p:par>
+                    <p:cTn id="8" fill="hold">
+                      <p:stCondLst>
+                        <p:cond delay="indefinite"/>
+                      </p:stCondLst>
+                      <p:childTnLst>
+                        <p:par>
+                          <p:cTn id="9" fill="hold">
+                            <p:stCondLst>
+                              <p:cond delay="0"/>
+                            </p:stCondLst>
+                            <p:childTnLst>
+                              <p:par>
+                                <p:cTn id="10" presetID="10" presetClass="entr" presetSubtype="0" fill="hold" nodeType="clickEffect">
+                                  <p:stCondLst>
+                                    <p:cond delay="0"/>
+                                  </p:stCondLst>
+                                  <p:childTnLst>
+                                    <p:set>
+                                      <p:cBhvr>
+                                        <p:cTn id="11" dur="1" fill="hold">
+                                          <p:stCondLst>
+                                            <p:cond delay="0"/>
+                                          </p:stCondLst>
+                                        </p:cTn>
+                                        <p:tgtEl>
+                                          <p:spTgt spid="8">
+                                            <p:txEl>
+                                              <p:pRg st="1" end="1"/>
+                                            </p:txEl>
+                                          </p:spTgt>
+                                        </p:tgtEl>
+                                        <p:attrNameLst>
+                                          <p:attrName>style.visibility</p:attrName>
+                                        </p:attrNameLst>
+                                      </p:cBhvr>
+                                      <p:to>
+                                        <p:strVal val="visible"/>
+                                      </p:to>
+                                    </p:set>
+                                    <p:animEffect transition="in" filter="fade">
+                                      <p:cBhvr>
+                                        <p:cTn id="12" dur="500"/>
+                                        <p:tgtEl>
+                                          <p:spTgt spid="8">
+                                            <p:txEl>
+                                              <p:pRg st="1" end="1"/>
+                                            </p:txEl>
+                                          </p:spTgt>
+                                        </p:tgtEl>
+                                      </p:cBhvr>
+                                    </p:animEffect>
+                                  </p:childTnLst>
+                                </p:cTn>
+                              </p:par>
+                            </p:childTnLst>
+                          </p:cTn>
+                        </p:par>
+                      </p:childTnLst>
+                    </p:cTn>
+                  </p:par>
+                  <p:par>
+                    <p:cTn id="13" fill="hold">
+                      <p:stCondLst>
+                        <p:cond delay="indefinite"/>
+                      </p:stCondLst>
+                      <p:childTnLst>
+                        <p:par>
+                          <p:cTn id="14" fill="hold">
+                            <p:stCondLst>
+                              <p:cond delay="0"/>
+                            </p:stCondLst>
+                            <p:childTnLst>
+                              <p:par>
+                                <p:cTn id="15" presetID="10" presetClass="entr" presetSubtype="0" fill="hold" nodeType="clickEffect">
+                                  <p:stCondLst>
+                                    <p:cond delay="0"/>
+                                  </p:stCondLst>
+                                  <p:childTnLst>
+                                    <p:set>
+                                      <p:cBhvr>
+                                        <p:cTn id="16" dur="1" fill="hold">
+                                          <p:stCondLst>
+                                            <p:cond delay="0"/>
+                                          </p:stCondLst>
+                                        </p:cTn>
+                                        <p:tgtEl>
+                                          <p:spTgt spid="8">
+                                            <p:txEl>
+                                              <p:pRg st="2" end="2"/>
+                                            </p:txEl>
+                                          </p:spTgt>
+                                        </p:tgtEl>
+                                        <p:attrNameLst>
+                                          <p:attrName>style.visibility</p:attrName>
+                                        </p:attrNameLst>
+                                      </p:cBhvr>
+                                      <p:to>
+                                        <p:strVal val="visible"/>
+                                      </p:to>
+                                    </p:set>
+                                    <p:animEffect transition="in" filter="fade">
+                                      <p:cBhvr>
+                                        <p:cTn id="17" dur="500"/>
+                                        <p:tgtEl>
+                                          <p:spTgt spid="8">
+                                            <p:txEl>
+                                              <p:pRg st="2" end="2"/>
+                                            </p:txEl>
+                                          </p:spTgt>
+                                        </p:tgtEl>
+                                      </p:cBhvr>
+                                    </p:animEffect>
+                                  </p:childTnLst>
+                                </p:cTn>
+                              </p:par>
+                            </p:childTnLst>
+                          </p:cTn>
+                        </p:par>
+                      </p:childTnLst>
+                    </p:cTn>
+                  </p:par>
+                  <p:par>
+                    <p:cTn id="18" fill="hold">
+                      <p:stCondLst>
+                        <p:cond delay="indefinite"/>
+                      </p:stCondLst>
+                      <p:childTnLst>
+                        <p:par>
+                          <p:cTn id="19" fill="hold">
+                            <p:stCondLst>
+                              <p:cond delay="0"/>
+                            </p:stCondLst>
+                            <p:childTnLst>
+                              <p:par>
+                                <p:cTn id="20" presetID="10" presetClass="entr" presetSubtype="0" fill="hold" nodeType="clickEffect">
+                                  <p:stCondLst>
+                                    <p:cond delay="0"/>
+                                  </p:stCondLst>
+                                  <p:childTnLst>
+                                    <p:set>
+                                      <p:cBhvr>
+                                        <p:cTn id="21" dur="1" fill="hold">
+                                          <p:stCondLst>
+                                            <p:cond delay="0"/>
+                                          </p:stCondLst>
+                                        </p:cTn>
+                                        <p:tgtEl>
+                                          <p:spTgt spid="8">
+                                            <p:txEl>
+                                              <p:pRg st="3" end="3"/>
+                                            </p:txEl>
+                                          </p:spTgt>
+                                        </p:tgtEl>
+                                        <p:attrNameLst>
+                                          <p:attrName>style.visibility</p:attrName>
+                                        </p:attrNameLst>
+                                      </p:cBhvr>
+                                      <p:to>
+                                        <p:strVal val="visible"/>
+                                      </p:to>
+                                    </p:set>
+                                    <p:animEffect transition="in" filter="fade">
+                                      <p:cBhvr>
+                                        <p:cTn id="22" dur="500"/>
+                                        <p:tgtEl>
+                                          <p:spTgt spid="8">
+                                            <p:txEl>
+                                              <p:pRg st="3" end="3"/>
+                                            </p:txEl>
+                                          </p:spTgt>
+                                        </p:tgtEl>
+                                      </p:cBhvr>
+                                    </p:animEffect>
+                                  </p:childTnLst>
+                                </p:cTn>
+                              </p:par>
+                            </p:childTnLst>
+                          </p:cTn>
+                        </p:par>
+                      </p:childTnLst>
+                    </p:cTn>
+                  </p:par>
+                  <p:par>
+                    <p:cTn id="23" fill="hold">
+                      <p:stCondLst>
+                        <p:cond delay="indefinite"/>
+                      </p:stCondLst>
+                      <p:childTnLst>
+                        <p:par>
+                          <p:cTn id="24" fill="hold">
+                            <p:stCondLst>
+                              <p:cond delay="0"/>
+                            </p:stCondLst>
+                            <p:childTnLst>
+                              <p:par>
+                                <p:cTn id="25" presetID="10" presetClass="entr" presetSubtype="0" fill="hold" nodeType="clickEffect">
+                                  <p:stCondLst>
+                                    <p:cond delay="0"/>
+                                  </p:stCondLst>
+                                  <p:childTnLst>
+                                    <p:set>
+                                      <p:cBhvr>
+                                        <p:cTn id="26" dur="1" fill="hold">
+                                          <p:stCondLst>
+                                            <p:cond delay="0"/>
+                                          </p:stCondLst>
+                                        </p:cTn>
+                                        <p:tgtEl>
+                                          <p:spTgt spid="8">
+                                            <p:txEl>
+                                              <p:pRg st="4" end="4"/>
+                                            </p:txEl>
+                                          </p:spTgt>
+                                        </p:tgtEl>
+                                        <p:attrNameLst>
+                                          <p:attrName>style.visibility</p:attrName>
+                                        </p:attrNameLst>
+                                      </p:cBhvr>
+                                      <p:to>
+                                        <p:strVal val="visible"/>
+                                      </p:to>
+                                    </p:set>
+                                    <p:animEffect transition="in" filter="fade">
+                                      <p:cBhvr>
+                                        <p:cTn id="27" dur="500"/>
+                                        <p:tgtEl>
+                                          <p:spTgt spid="8">
+                                            <p:txEl>
+                                              <p:pRg st="4" end="4"/>
+                                            </p:txEl>
+                                          </p:spTgt>
+                                        </p:tgtEl>
+                                      </p:cBhvr>
+                                    </p:animEffect>
+                                  </p:childTnLst>
+                                </p:cTn>
+                              </p:par>
+                            </p:childTnLst>
+                          </p:cTn>
+                        </p:par>
+                      </p:childTnLst>
+                    </p:cTn>
+                  </p:par>
+                  <p:par>
+                    <p:cTn id="28" fill="hold">
+                      <p:stCondLst>
+                        <p:cond delay="indefinite"/>
+                      </p:stCondLst>
+                      <p:childTnLst>
+                        <p:par>
+                          <p:cTn id="29" fill="hold">
+                            <p:stCondLst>
+                              <p:cond delay="0"/>
+                            </p:stCondLst>
+                            <p:childTnLst>
+                              <p:par>
+                                <p:cTn id="30" presetID="10" presetClass="entr" presetSubtype="0" fill="hold" nodeType="clickEffect">
+                                  <p:stCondLst>
+                                    <p:cond delay="0"/>
+                                  </p:stCondLst>
+                                  <p:childTnLst>
+                                    <p:set>
+                                      <p:cBhvr>
+                                        <p:cTn id="31" dur="1" fill="hold">
+                                          <p:stCondLst>
+                                            <p:cond delay="0"/>
+                                          </p:stCondLst>
+                                        </p:cTn>
+                                        <p:tgtEl>
+                                          <p:spTgt spid="8">
+                                            <p:txEl>
+                                              <p:pRg st="5" end="5"/>
+                                            </p:txEl>
+                                          </p:spTgt>
+                                        </p:tgtEl>
+                                        <p:attrNameLst>
+                                          <p:attrName>style.visibility</p:attrName>
+                                        </p:attrNameLst>
+                                      </p:cBhvr>
+                                      <p:to>
+                                        <p:strVal val="visible"/>
+                                      </p:to>
+                                    </p:set>
+                                    <p:animEffect transition="in" filter="fade">
+                                      <p:cBhvr>
+                                        <p:cTn id="32" dur="500"/>
+                                        <p:tgtEl>
+                                          <p:spTgt spid="8">
+                                            <p:txEl>
+                                              <p:pRg st="5" end="5"/>
+                                            </p:txEl>
+                                          </p:spTgt>
+                                        </p:tgtEl>
+                                      </p:cBhvr>
+                                    </p:animEffect>
+                                  </p:childTnLst>
+                                </p:cTn>
+                              </p:par>
+                            </p:childTnLst>
+                          </p:cTn>
+                        </p:par>
+                      </p:childTnLst>
+                    </p:cTn>
+                  </p:par>
+                </p:childTnLst>
+              </p:cTn>
+              <p:prevCondLst>
+                <p:cond evt="onPrev" delay="0">
+                  <p:tgtEl>
+                    <p:sldTgt/>
+                  </p:tgtEl>
+                </p:cond>
+              </p:prevCondLst>
+              <p:nextCondLst>
+                <p:cond evt="onNext" delay="0">
+                  <p:tgtEl>
+                    <p:sldTgt/>
+                  </p:tgtEl>
+                </p:cond>
+              </p:nextCondLst>
+            </p:seq>
+          </p:childTnLst>
+        </p:cTn>
+      </p:par>
+    </p:tnLst>
+  </p:timing>
 </p:sld>
 </file>
 
@@ -3878,6 +4339,470 @@
                 <a:latin typeface="Euclid Circular B" panose="020B0504000000000000" pitchFamily="34" charset="0"/>
                 <a:ea typeface="Euclid Circular B" panose="020B0504000000000000" pitchFamily="34" charset="0"/>
               </a:rPr>
+              <a:t>EventHub</a:t>
+            </a:r>
+            <a:r>
+              <a:rPr lang="en-US" dirty="0">
+                <a:solidFill>
+                  <a:srgbClr val="292D33"/>
+                </a:solidFill>
+                <a:latin typeface="Euclid Circular B" panose="020B0504000000000000" pitchFamily="34" charset="0"/>
+                <a:ea typeface="Euclid Circular B" panose="020B0504000000000000" pitchFamily="34" charset="0"/>
+              </a:rPr>
+              <a:t>: The architecture</a:t>
+            </a:r>
+          </a:p>
+        </p:txBody>
+      </p:sp>
+      <p:sp>
+        <p:nvSpPr>
+          <p:cNvPr id="8" name="Content Placeholder 2">
+            <a:extLst>
+              <a:ext uri="{FF2B5EF4-FFF2-40B4-BE49-F238E27FC236}">
+                <a16:creationId xmlns:a16="http://schemas.microsoft.com/office/drawing/2014/main" id="{22E85D3D-C50F-4A91-9B44-66DF397ED0E5}"/>
+              </a:ext>
+            </a:extLst>
+          </p:cNvPr>
+          <p:cNvSpPr>
+            <a:spLocks noGrp="1"/>
+          </p:cNvSpPr>
+          <p:nvPr>
+            <p:ph idx="1"/>
+          </p:nvPr>
+        </p:nvSpPr>
+        <p:spPr>
+          <a:xfrm>
+            <a:off x="838200" y="1825625"/>
+            <a:ext cx="5015845" cy="4351338"/>
+          </a:xfrm>
+        </p:spPr>
+        <p:txBody>
+          <a:bodyPr>
+            <a:normAutofit/>
+          </a:bodyPr>
+          <a:lstStyle/>
+          <a:p>
+            <a:r>
+              <a:rPr lang="en-US" sz="2400" dirty="0">
+                <a:latin typeface="Euclid Circular B" panose="020B0504000000000000" pitchFamily="34" charset="0"/>
+                <a:ea typeface="Euclid Circular B" panose="020B0504000000000000" pitchFamily="34" charset="0"/>
+              </a:rPr>
+              <a:t>Two web applications:</a:t>
+            </a:r>
+          </a:p>
+          <a:p>
+            <a:pPr lvl="1"/>
+            <a:r>
+              <a:rPr lang="en-US" sz="2000" dirty="0">
+                <a:latin typeface="Euclid Circular B" panose="020B0504000000000000" pitchFamily="34" charset="0"/>
+                <a:ea typeface="Euclid Circular B" panose="020B0504000000000000" pitchFamily="34" charset="0"/>
+              </a:rPr>
+              <a:t>Main website (Razor Pages)</a:t>
+            </a:r>
+          </a:p>
+          <a:p>
+            <a:pPr lvl="1"/>
+            <a:r>
+              <a:rPr lang="en-US" sz="2000" dirty="0">
+                <a:latin typeface="Euclid Circular B" panose="020B0504000000000000" pitchFamily="34" charset="0"/>
+                <a:ea typeface="Euclid Circular B" panose="020B0504000000000000" pitchFamily="34" charset="0"/>
+              </a:rPr>
+              <a:t>Admin application (</a:t>
+            </a:r>
+            <a:r>
+              <a:rPr lang="en-US" sz="2000" dirty="0" err="1">
+                <a:latin typeface="Euclid Circular B" panose="020B0504000000000000" pitchFamily="34" charset="0"/>
+                <a:ea typeface="Euclid Circular B" panose="020B0504000000000000" pitchFamily="34" charset="0"/>
+              </a:rPr>
+              <a:t>Blazor</a:t>
+            </a:r>
+            <a:r>
+              <a:rPr lang="en-US" sz="2000" dirty="0">
+                <a:latin typeface="Euclid Circular B" panose="020B0504000000000000" pitchFamily="34" charset="0"/>
+                <a:ea typeface="Euclid Circular B" panose="020B0504000000000000" pitchFamily="34" charset="0"/>
+              </a:rPr>
+              <a:t> WASM)</a:t>
+            </a:r>
+          </a:p>
+          <a:p>
+            <a:r>
+              <a:rPr lang="en-US" sz="2400" dirty="0">
+                <a:latin typeface="Euclid Circular B" panose="020B0504000000000000" pitchFamily="34" charset="0"/>
+                <a:ea typeface="Euclid Circular B" panose="020B0504000000000000" pitchFamily="34" charset="0"/>
+              </a:rPr>
+              <a:t>Authentication server (built with the IdentityServer4)</a:t>
+            </a:r>
+          </a:p>
+          <a:p>
+            <a:r>
+              <a:rPr lang="en-US" sz="2400" dirty="0">
+                <a:latin typeface="Euclid Circular B" panose="020B0504000000000000" pitchFamily="34" charset="0"/>
+                <a:ea typeface="Euclid Circular B" panose="020B0504000000000000" pitchFamily="34" charset="0"/>
+              </a:rPr>
+              <a:t>Two API endpoints (one for each web application)</a:t>
+            </a:r>
+          </a:p>
+          <a:p>
+            <a:r>
+              <a:rPr lang="en-US" sz="2400" dirty="0">
+                <a:latin typeface="Euclid Circular B" panose="020B0504000000000000" pitchFamily="34" charset="0"/>
+                <a:ea typeface="Euclid Circular B" panose="020B0504000000000000" pitchFamily="34" charset="0"/>
+              </a:rPr>
+              <a:t>Background service (console application)</a:t>
+            </a:r>
+          </a:p>
+        </p:txBody>
+      </p:sp>
+      <p:pic>
+        <p:nvPicPr>
+          <p:cNvPr id="5" name="Picture 4">
+            <a:extLst>
+              <a:ext uri="{FF2B5EF4-FFF2-40B4-BE49-F238E27FC236}">
+                <a16:creationId xmlns:a16="http://schemas.microsoft.com/office/drawing/2014/main" id="{A880050E-A794-423F-976A-13089EA9BA0C}"/>
+              </a:ext>
+            </a:extLst>
+          </p:cNvPr>
+          <p:cNvPicPr>
+            <a:picLocks noChangeAspect="1"/>
+          </p:cNvPicPr>
+          <p:nvPr/>
+        </p:nvPicPr>
+        <p:blipFill>
+          <a:blip r:embed="rId3"/>
+          <a:stretch>
+            <a:fillRect/>
+          </a:stretch>
+        </p:blipFill>
+        <p:spPr>
+          <a:xfrm>
+            <a:off x="6438508" y="1487324"/>
+            <a:ext cx="3306401" cy="5183302"/>
+          </a:xfrm>
+          <a:prstGeom prst="rect">
+            <a:avLst/>
+          </a:prstGeom>
+        </p:spPr>
+      </p:pic>
+    </p:spTree>
+    <p:extLst>
+      <p:ext uri="{BB962C8B-B14F-4D97-AF65-F5344CB8AC3E}">
+        <p14:creationId xmlns:p14="http://schemas.microsoft.com/office/powerpoint/2010/main" val="2531697215"/>
+      </p:ext>
+    </p:extLst>
+  </p:cSld>
+  <p:clrMapOvr>
+    <a:masterClrMapping/>
+  </p:clrMapOvr>
+</p:sld>
+</file>
+
+<file path=ppt/slides/slide14.xml><?xml version="1.0" encoding="utf-8"?>
+<p:sld xmlns:a="http://schemas.openxmlformats.org/drawingml/2006/main" xmlns:r="http://schemas.openxmlformats.org/officeDocument/2006/relationships" xmlns:p="http://schemas.openxmlformats.org/presentationml/2006/main">
+  <p:cSld>
+    <p:bg>
+      <p:bgPr>
+        <a:blipFill dpi="0" rotWithShape="1">
+          <a:blip r:embed="rId2">
+            <a:lum/>
+          </a:blip>
+          <a:srcRect/>
+          <a:stretch>
+            <a:fillRect/>
+          </a:stretch>
+        </a:blipFill>
+        <a:effectLst/>
+      </p:bgPr>
+    </p:bg>
+    <p:spTree>
+      <p:nvGrpSpPr>
+        <p:cNvPr id="1" name=""/>
+        <p:cNvGrpSpPr/>
+        <p:nvPr/>
+      </p:nvGrpSpPr>
+      <p:grpSpPr>
+        <a:xfrm>
+          <a:off x="0" y="0"/>
+          <a:ext cx="0" cy="0"/>
+          <a:chOff x="0" y="0"/>
+          <a:chExt cx="0" cy="0"/>
+        </a:xfrm>
+      </p:grpSpPr>
+      <p:sp>
+        <p:nvSpPr>
+          <p:cNvPr id="2" name="Title 1">
+            <a:extLst>
+              <a:ext uri="{FF2B5EF4-FFF2-40B4-BE49-F238E27FC236}">
+                <a16:creationId xmlns:a16="http://schemas.microsoft.com/office/drawing/2014/main" id="{55E11F08-6CA0-48F1-AD67-97430DDA07F0}"/>
+              </a:ext>
+            </a:extLst>
+          </p:cNvPr>
+          <p:cNvSpPr>
+            <a:spLocks noGrp="1"/>
+          </p:cNvSpPr>
+          <p:nvPr>
+            <p:ph type="title"/>
+          </p:nvPr>
+        </p:nvSpPr>
+        <p:spPr/>
+        <p:txBody>
+          <a:bodyPr/>
+          <a:lstStyle/>
+          <a:p>
+            <a:r>
+              <a:rPr lang="en-US" b="1" dirty="0">
+                <a:solidFill>
+                  <a:srgbClr val="292D33"/>
+                </a:solidFill>
+                <a:latin typeface="Euclid Circular B" panose="020B0504000000000000" pitchFamily="34" charset="0"/>
+                <a:ea typeface="Euclid Circular B" panose="020B0504000000000000" pitchFamily="34" charset="0"/>
+              </a:rPr>
+              <a:t>EventHub</a:t>
+            </a:r>
+            <a:r>
+              <a:rPr lang="en-US" dirty="0">
+                <a:solidFill>
+                  <a:srgbClr val="292D33"/>
+                </a:solidFill>
+                <a:latin typeface="Euclid Circular B" panose="020B0504000000000000" pitchFamily="34" charset="0"/>
+                <a:ea typeface="Euclid Circular B" panose="020B0504000000000000" pitchFamily="34" charset="0"/>
+              </a:rPr>
+              <a:t>: The domain</a:t>
+            </a:r>
+          </a:p>
+        </p:txBody>
+      </p:sp>
+      <p:pic>
+        <p:nvPicPr>
+          <p:cNvPr id="5" name="Picture 4">
+            <a:extLst>
+              <a:ext uri="{FF2B5EF4-FFF2-40B4-BE49-F238E27FC236}">
+                <a16:creationId xmlns:a16="http://schemas.microsoft.com/office/drawing/2014/main" id="{10BFBEE3-DA80-4370-8F60-263E67CD46E8}"/>
+              </a:ext>
+            </a:extLst>
+          </p:cNvPr>
+          <p:cNvPicPr>
+            <a:picLocks noChangeAspect="1"/>
+          </p:cNvPicPr>
+          <p:nvPr/>
+        </p:nvPicPr>
+        <p:blipFill>
+          <a:blip r:embed="rId3"/>
+          <a:stretch>
+            <a:fillRect/>
+          </a:stretch>
+        </p:blipFill>
+        <p:spPr>
+          <a:xfrm>
+            <a:off x="2447090" y="1598575"/>
+            <a:ext cx="7297819" cy="4673441"/>
+          </a:xfrm>
+          <a:prstGeom prst="rect">
+            <a:avLst/>
+          </a:prstGeom>
+        </p:spPr>
+      </p:pic>
+    </p:spTree>
+    <p:extLst>
+      <p:ext uri="{BB962C8B-B14F-4D97-AF65-F5344CB8AC3E}">
+        <p14:creationId xmlns:p14="http://schemas.microsoft.com/office/powerpoint/2010/main" val="3325606617"/>
+      </p:ext>
+    </p:extLst>
+  </p:cSld>
+  <p:clrMapOvr>
+    <a:masterClrMapping/>
+  </p:clrMapOvr>
+</p:sld>
+</file>
+
+<file path=ppt/slides/slide15.xml><?xml version="1.0" encoding="utf-8"?>
+<p:sld xmlns:a="http://schemas.openxmlformats.org/drawingml/2006/main" xmlns:r="http://schemas.openxmlformats.org/officeDocument/2006/relationships" xmlns:p="http://schemas.openxmlformats.org/presentationml/2006/main">
+  <p:cSld>
+    <p:bg>
+      <p:bgPr>
+        <a:blipFill dpi="0" rotWithShape="1">
+          <a:blip r:embed="rId2">
+            <a:lum/>
+          </a:blip>
+          <a:srcRect/>
+          <a:stretch>
+            <a:fillRect/>
+          </a:stretch>
+        </a:blipFill>
+        <a:effectLst/>
+      </p:bgPr>
+    </p:bg>
+    <p:spTree>
+      <p:nvGrpSpPr>
+        <p:cNvPr id="1" name=""/>
+        <p:cNvGrpSpPr/>
+        <p:nvPr/>
+      </p:nvGrpSpPr>
+      <p:grpSpPr>
+        <a:xfrm>
+          <a:off x="0" y="0"/>
+          <a:ext cx="0" cy="0"/>
+          <a:chOff x="0" y="0"/>
+          <a:chExt cx="0" cy="0"/>
+        </a:xfrm>
+      </p:grpSpPr>
+      <p:sp>
+        <p:nvSpPr>
+          <p:cNvPr id="2" name="Title 1">
+            <a:extLst>
+              <a:ext uri="{FF2B5EF4-FFF2-40B4-BE49-F238E27FC236}">
+                <a16:creationId xmlns:a16="http://schemas.microsoft.com/office/drawing/2014/main" id="{55E11F08-6CA0-48F1-AD67-97430DDA07F0}"/>
+              </a:ext>
+            </a:extLst>
+          </p:cNvPr>
+          <p:cNvSpPr>
+            <a:spLocks noGrp="1"/>
+          </p:cNvSpPr>
+          <p:nvPr>
+            <p:ph type="title"/>
+          </p:nvPr>
+        </p:nvSpPr>
+        <p:spPr/>
+        <p:txBody>
+          <a:bodyPr/>
+          <a:lstStyle/>
+          <a:p>
+            <a:r>
+              <a:rPr lang="en-US" b="1" dirty="0">
+                <a:solidFill>
+                  <a:srgbClr val="292D33"/>
+                </a:solidFill>
+                <a:latin typeface="Euclid Circular B" panose="020B0504000000000000" pitchFamily="34" charset="0"/>
+                <a:ea typeface="Euclid Circular B" panose="020B0504000000000000" pitchFamily="34" charset="0"/>
+              </a:rPr>
+              <a:t>EventHub</a:t>
+            </a:r>
+            <a:r>
+              <a:rPr lang="en-US" dirty="0">
+                <a:solidFill>
+                  <a:srgbClr val="292D33"/>
+                </a:solidFill>
+                <a:latin typeface="Euclid Circular B" panose="020B0504000000000000" pitchFamily="34" charset="0"/>
+                <a:ea typeface="Euclid Circular B" panose="020B0504000000000000" pitchFamily="34" charset="0"/>
+              </a:rPr>
+              <a:t>: Source code</a:t>
+            </a:r>
+          </a:p>
+        </p:txBody>
+      </p:sp>
+      <p:sp>
+        <p:nvSpPr>
+          <p:cNvPr id="3" name="Content Placeholder 2">
+            <a:extLst>
+              <a:ext uri="{FF2B5EF4-FFF2-40B4-BE49-F238E27FC236}">
+                <a16:creationId xmlns:a16="http://schemas.microsoft.com/office/drawing/2014/main" id="{891C7693-D3DF-4635-96F4-97F3B4136FDF}"/>
+              </a:ext>
+            </a:extLst>
+          </p:cNvPr>
+          <p:cNvSpPr>
+            <a:spLocks noGrp="1"/>
+          </p:cNvSpPr>
+          <p:nvPr>
+            <p:ph idx="1"/>
+          </p:nvPr>
+        </p:nvSpPr>
+        <p:spPr>
+          <a:xfrm>
+            <a:off x="838200" y="1825625"/>
+            <a:ext cx="10515600" cy="3422236"/>
+          </a:xfrm>
+        </p:spPr>
+        <p:txBody>
+          <a:bodyPr anchor="ctr">
+            <a:normAutofit/>
+          </a:bodyPr>
+          <a:lstStyle/>
+          <a:p>
+            <a:pPr marL="0" indent="0" algn="ctr">
+              <a:buNone/>
+            </a:pPr>
+            <a:r>
+              <a:rPr lang="en-US" sz="4000" b="1" dirty="0">
+                <a:latin typeface="Euclid Circular B" panose="020B0504000000000000" pitchFamily="34" charset="0"/>
+                <a:ea typeface="Euclid Circular B" panose="020B0504000000000000" pitchFamily="34" charset="0"/>
+              </a:rPr>
+              <a:t>https://github.com/volosoft/eventhub</a:t>
+            </a:r>
+          </a:p>
+        </p:txBody>
+      </p:sp>
+    </p:spTree>
+    <p:extLst>
+      <p:ext uri="{BB962C8B-B14F-4D97-AF65-F5344CB8AC3E}">
+        <p14:creationId xmlns:p14="http://schemas.microsoft.com/office/powerpoint/2010/main" val="840977384"/>
+      </p:ext>
+    </p:extLst>
+  </p:cSld>
+  <p:clrMapOvr>
+    <a:masterClrMapping/>
+  </p:clrMapOvr>
+</p:sld>
+</file>
+
+<file path=ppt/slides/slide16.xml><?xml version="1.0" encoding="utf-8"?>
+<p:sld xmlns:a="http://schemas.openxmlformats.org/drawingml/2006/main" xmlns:r="http://schemas.openxmlformats.org/officeDocument/2006/relationships" xmlns:p="http://schemas.openxmlformats.org/presentationml/2006/main">
+  <p:cSld>
+    <p:bg>
+      <p:bgPr>
+        <a:blipFill dpi="0" rotWithShape="1">
+          <a:blip r:embed="rId2">
+            <a:lum/>
+          </a:blip>
+          <a:srcRect/>
+          <a:stretch>
+            <a:fillRect/>
+          </a:stretch>
+        </a:blipFill>
+        <a:effectLst/>
+      </p:bgPr>
+    </p:bg>
+    <p:spTree>
+      <p:nvGrpSpPr>
+        <p:cNvPr id="1" name=""/>
+        <p:cNvGrpSpPr/>
+        <p:nvPr/>
+      </p:nvGrpSpPr>
+      <p:grpSpPr>
+        <a:xfrm>
+          <a:off x="0" y="0"/>
+          <a:ext cx="0" cy="0"/>
+          <a:chOff x="0" y="0"/>
+          <a:chExt cx="0" cy="0"/>
+        </a:xfrm>
+      </p:grpSpPr>
+      <p:sp>
+        <p:nvSpPr>
+          <p:cNvPr id="2" name="Title 1">
+            <a:extLst>
+              <a:ext uri="{FF2B5EF4-FFF2-40B4-BE49-F238E27FC236}">
+                <a16:creationId xmlns:a16="http://schemas.microsoft.com/office/drawing/2014/main" id="{55E11F08-6CA0-48F1-AD67-97430DDA07F0}"/>
+              </a:ext>
+            </a:extLst>
+          </p:cNvPr>
+          <p:cNvSpPr>
+            <a:spLocks noGrp="1"/>
+          </p:cNvSpPr>
+          <p:nvPr>
+            <p:ph type="title"/>
+          </p:nvPr>
+        </p:nvSpPr>
+        <p:spPr/>
+        <p:txBody>
+          <a:bodyPr/>
+          <a:lstStyle/>
+          <a:p>
+            <a:r>
+              <a:rPr lang="en-US" b="1" dirty="0">
+                <a:solidFill>
+                  <a:srgbClr val="292D33"/>
+                </a:solidFill>
+                <a:latin typeface="Euclid Circular B" panose="020B0504000000000000" pitchFamily="34" charset="0"/>
+                <a:ea typeface="Euclid Circular B" panose="020B0504000000000000" pitchFamily="34" charset="0"/>
+              </a:rPr>
               <a:t>Title</a:t>
             </a:r>
             <a:endParaRPr lang="en-US" dirty="0">
@@ -3936,6 +4861,260 @@
     <p:extLst>
       <p:ext uri="{BB962C8B-B14F-4D97-AF65-F5344CB8AC3E}">
         <p14:creationId xmlns:p14="http://schemas.microsoft.com/office/powerpoint/2010/main" val="1709922340"/>
+      </p:ext>
+    </p:extLst>
+  </p:cSld>
+  <p:clrMapOvr>
+    <a:masterClrMapping/>
+  </p:clrMapOvr>
+</p:sld>
+</file>
+
+<file path=ppt/slides/slide17.xml><?xml version="1.0" encoding="utf-8"?>
+<p:sld xmlns:a="http://schemas.openxmlformats.org/drawingml/2006/main" xmlns:r="http://schemas.openxmlformats.org/officeDocument/2006/relationships" xmlns:p="http://schemas.openxmlformats.org/presentationml/2006/main">
+  <p:cSld>
+    <p:bg>
+      <p:bgPr>
+        <a:blipFill dpi="0" rotWithShape="1">
+          <a:blip r:embed="rId2">
+            <a:lum/>
+          </a:blip>
+          <a:srcRect/>
+          <a:stretch>
+            <a:fillRect/>
+          </a:stretch>
+        </a:blipFill>
+        <a:effectLst/>
+      </p:bgPr>
+    </p:bg>
+    <p:spTree>
+      <p:nvGrpSpPr>
+        <p:cNvPr id="1" name=""/>
+        <p:cNvGrpSpPr/>
+        <p:nvPr/>
+      </p:nvGrpSpPr>
+      <p:grpSpPr>
+        <a:xfrm>
+          <a:off x="0" y="0"/>
+          <a:ext cx="0" cy="0"/>
+          <a:chOff x="0" y="0"/>
+          <a:chExt cx="0" cy="0"/>
+        </a:xfrm>
+      </p:grpSpPr>
+      <p:sp>
+        <p:nvSpPr>
+          <p:cNvPr id="2" name="Title 1">
+            <a:extLst>
+              <a:ext uri="{FF2B5EF4-FFF2-40B4-BE49-F238E27FC236}">
+                <a16:creationId xmlns:a16="http://schemas.microsoft.com/office/drawing/2014/main" id="{55E11F08-6CA0-48F1-AD67-97430DDA07F0}"/>
+              </a:ext>
+            </a:extLst>
+          </p:cNvPr>
+          <p:cNvSpPr>
+            <a:spLocks noGrp="1"/>
+          </p:cNvSpPr>
+          <p:nvPr>
+            <p:ph type="title"/>
+          </p:nvPr>
+        </p:nvSpPr>
+        <p:spPr/>
+        <p:txBody>
+          <a:bodyPr/>
+          <a:lstStyle/>
+          <a:p>
+            <a:r>
+              <a:rPr lang="en-US" b="1" dirty="0">
+                <a:solidFill>
+                  <a:srgbClr val="292D33"/>
+                </a:solidFill>
+                <a:latin typeface="Euclid Circular B" panose="020B0504000000000000" pitchFamily="34" charset="0"/>
+                <a:ea typeface="Euclid Circular B" panose="020B0504000000000000" pitchFamily="34" charset="0"/>
+              </a:rPr>
+              <a:t>Title</a:t>
+            </a:r>
+            <a:endParaRPr lang="en-US" dirty="0">
+              <a:solidFill>
+                <a:srgbClr val="292D33"/>
+              </a:solidFill>
+              <a:latin typeface="Euclid Circular B" panose="020B0504000000000000" pitchFamily="34" charset="0"/>
+              <a:ea typeface="Euclid Circular B" panose="020B0504000000000000" pitchFamily="34" charset="0"/>
+            </a:endParaRPr>
+          </a:p>
+        </p:txBody>
+      </p:sp>
+      <p:sp>
+        <p:nvSpPr>
+          <p:cNvPr id="3" name="Content Placeholder 2">
+            <a:extLst>
+              <a:ext uri="{FF2B5EF4-FFF2-40B4-BE49-F238E27FC236}">
+                <a16:creationId xmlns:a16="http://schemas.microsoft.com/office/drawing/2014/main" id="{891C7693-D3DF-4635-96F4-97F3B4136FDF}"/>
+              </a:ext>
+            </a:extLst>
+          </p:cNvPr>
+          <p:cNvSpPr>
+            <a:spLocks noGrp="1"/>
+          </p:cNvSpPr>
+          <p:nvPr>
+            <p:ph idx="1"/>
+          </p:nvPr>
+        </p:nvSpPr>
+        <p:spPr/>
+        <p:txBody>
+          <a:bodyPr/>
+          <a:lstStyle/>
+          <a:p>
+            <a:r>
+              <a:rPr lang="en-US" dirty="0">
+                <a:latin typeface="Euclid Circular B" panose="020B0504000000000000" pitchFamily="34" charset="0"/>
+                <a:ea typeface="Euclid Circular B" panose="020B0504000000000000" pitchFamily="34" charset="0"/>
+              </a:rPr>
+              <a:t>TODO</a:t>
+            </a:r>
+            <a:r>
+              <a:rPr lang="en-US">
+                <a:latin typeface="Euclid Circular B" panose="020B0504000000000000" pitchFamily="34" charset="0"/>
+                <a:ea typeface="Euclid Circular B" panose="020B0504000000000000" pitchFamily="34" charset="0"/>
+              </a:rPr>
+              <a:t>: ...</a:t>
+            </a:r>
+            <a:endParaRPr lang="en-US" dirty="0">
+              <a:latin typeface="Euclid Circular B" panose="020B0504000000000000" pitchFamily="34" charset="0"/>
+              <a:ea typeface="Euclid Circular B" panose="020B0504000000000000" pitchFamily="34" charset="0"/>
+            </a:endParaRPr>
+          </a:p>
+        </p:txBody>
+      </p:sp>
+    </p:spTree>
+    <p:extLst>
+      <p:ext uri="{BB962C8B-B14F-4D97-AF65-F5344CB8AC3E}">
+        <p14:creationId xmlns:p14="http://schemas.microsoft.com/office/powerpoint/2010/main" val="393097051"/>
+      </p:ext>
+    </p:extLst>
+  </p:cSld>
+  <p:clrMapOvr>
+    <a:masterClrMapping/>
+  </p:clrMapOvr>
+</p:sld>
+</file>
+
+<file path=ppt/slides/slide18.xml><?xml version="1.0" encoding="utf-8"?>
+<p:sld xmlns:a="http://schemas.openxmlformats.org/drawingml/2006/main" xmlns:r="http://schemas.openxmlformats.org/officeDocument/2006/relationships" xmlns:p="http://schemas.openxmlformats.org/presentationml/2006/main">
+  <p:cSld>
+    <p:bg>
+      <p:bgPr>
+        <a:blipFill dpi="0" rotWithShape="1">
+          <a:blip r:embed="rId2">
+            <a:lum/>
+          </a:blip>
+          <a:srcRect/>
+          <a:stretch>
+            <a:fillRect/>
+          </a:stretch>
+        </a:blipFill>
+        <a:effectLst/>
+      </p:bgPr>
+    </p:bg>
+    <p:spTree>
+      <p:nvGrpSpPr>
+        <p:cNvPr id="1" name=""/>
+        <p:cNvGrpSpPr/>
+        <p:nvPr/>
+      </p:nvGrpSpPr>
+      <p:grpSpPr>
+        <a:xfrm>
+          <a:off x="0" y="0"/>
+          <a:ext cx="0" cy="0"/>
+          <a:chOff x="0" y="0"/>
+          <a:chExt cx="0" cy="0"/>
+        </a:xfrm>
+      </p:grpSpPr>
+      <p:sp>
+        <p:nvSpPr>
+          <p:cNvPr id="2" name="Title 1">
+            <a:extLst>
+              <a:ext uri="{FF2B5EF4-FFF2-40B4-BE49-F238E27FC236}">
+                <a16:creationId xmlns:a16="http://schemas.microsoft.com/office/drawing/2014/main" id="{55E11F08-6CA0-48F1-AD67-97430DDA07F0}"/>
+              </a:ext>
+            </a:extLst>
+          </p:cNvPr>
+          <p:cNvSpPr>
+            <a:spLocks noGrp="1"/>
+          </p:cNvSpPr>
+          <p:nvPr>
+            <p:ph type="title"/>
+          </p:nvPr>
+        </p:nvSpPr>
+        <p:spPr/>
+        <p:txBody>
+          <a:bodyPr/>
+          <a:lstStyle/>
+          <a:p>
+            <a:r>
+              <a:rPr lang="en-US" b="1" dirty="0">
+                <a:solidFill>
+                  <a:srgbClr val="292D33"/>
+                </a:solidFill>
+                <a:latin typeface="Euclid Circular B" panose="020B0504000000000000" pitchFamily="34" charset="0"/>
+                <a:ea typeface="Euclid Circular B" panose="020B0504000000000000" pitchFamily="34" charset="0"/>
+              </a:rPr>
+              <a:t>Title</a:t>
+            </a:r>
+            <a:endParaRPr lang="en-US" dirty="0">
+              <a:solidFill>
+                <a:srgbClr val="292D33"/>
+              </a:solidFill>
+              <a:latin typeface="Euclid Circular B" panose="020B0504000000000000" pitchFamily="34" charset="0"/>
+              <a:ea typeface="Euclid Circular B" panose="020B0504000000000000" pitchFamily="34" charset="0"/>
+            </a:endParaRPr>
+          </a:p>
+        </p:txBody>
+      </p:sp>
+      <p:sp>
+        <p:nvSpPr>
+          <p:cNvPr id="3" name="Content Placeholder 2">
+            <a:extLst>
+              <a:ext uri="{FF2B5EF4-FFF2-40B4-BE49-F238E27FC236}">
+                <a16:creationId xmlns:a16="http://schemas.microsoft.com/office/drawing/2014/main" id="{891C7693-D3DF-4635-96F4-97F3B4136FDF}"/>
+              </a:ext>
+            </a:extLst>
+          </p:cNvPr>
+          <p:cNvSpPr>
+            <a:spLocks noGrp="1"/>
+          </p:cNvSpPr>
+          <p:nvPr>
+            <p:ph idx="1"/>
+          </p:nvPr>
+        </p:nvSpPr>
+        <p:spPr/>
+        <p:txBody>
+          <a:bodyPr/>
+          <a:lstStyle/>
+          <a:p>
+            <a:r>
+              <a:rPr lang="en-US" dirty="0">
+                <a:latin typeface="Euclid Circular B" panose="020B0504000000000000" pitchFamily="34" charset="0"/>
+                <a:ea typeface="Euclid Circular B" panose="020B0504000000000000" pitchFamily="34" charset="0"/>
+              </a:rPr>
+              <a:t>TODO</a:t>
+            </a:r>
+            <a:r>
+              <a:rPr lang="en-US">
+                <a:latin typeface="Euclid Circular B" panose="020B0504000000000000" pitchFamily="34" charset="0"/>
+                <a:ea typeface="Euclid Circular B" panose="020B0504000000000000" pitchFamily="34" charset="0"/>
+              </a:rPr>
+              <a:t>: ...</a:t>
+            </a:r>
+            <a:endParaRPr lang="en-US" dirty="0">
+              <a:latin typeface="Euclid Circular B" panose="020B0504000000000000" pitchFamily="34" charset="0"/>
+              <a:ea typeface="Euclid Circular B" panose="020B0504000000000000" pitchFamily="34" charset="0"/>
+            </a:endParaRPr>
+          </a:p>
+        </p:txBody>
+      </p:sp>
+    </p:spTree>
+    <p:extLst>
+      <p:ext uri="{BB962C8B-B14F-4D97-AF65-F5344CB8AC3E}">
+        <p14:creationId xmlns:p14="http://schemas.microsoft.com/office/powerpoint/2010/main" val="2958617374"/>
       </p:ext>
     </p:extLst>
   </p:cSld>
@@ -4007,7 +5186,7 @@
                 <a:latin typeface="Euclid Circular B" panose="020B0504000000000000" pitchFamily="34" charset="0"/>
                 <a:ea typeface="Euclid Circular B" panose="020B0504000000000000" pitchFamily="34" charset="0"/>
               </a:rPr>
-              <a:t>INTRODUCTION</a:t>
+              <a:t>ABP</a:t>
             </a:r>
           </a:p>
         </p:txBody>
@@ -5598,7 +6777,7 @@
           <a:graphicData uri="http://schemas.openxmlformats.org/presentationml/2006/ole">
             <mc:AlternateContent xmlns:mc="http://schemas.openxmlformats.org/markup-compatibility/2006">
               <mc:Choice xmlns:v="urn:schemas-microsoft-com:vml" Requires="v">
-                <p:oleObj spid="_x0000_s3088" name="Bitmap Image" r:id="rId4" imgW="17059320" imgH="5762520" progId="Paint.Picture">
+                <p:oleObj spid="_x0000_s3098" name="Bitmap Image" r:id="rId4" imgW="17059320" imgH="5762520" progId="Paint.Picture">
                   <p:embed/>
                 </p:oleObj>
               </mc:Choice>
@@ -6314,69 +7493,33 @@
           <p:cNvPr id="2" name="Title 1">
             <a:extLst>
               <a:ext uri="{FF2B5EF4-FFF2-40B4-BE49-F238E27FC236}">
-                <a16:creationId xmlns:a16="http://schemas.microsoft.com/office/drawing/2014/main" id="{55E11F08-6CA0-48F1-AD67-97430DDA07F0}"/>
-              </a:ext>
-            </a:extLst>
-          </p:cNvPr>
-          <p:cNvSpPr>
-            <a:spLocks noGrp="1"/>
-          </p:cNvSpPr>
-          <p:nvPr>
-            <p:ph type="title"/>
+                <a16:creationId xmlns:a16="http://schemas.microsoft.com/office/drawing/2014/main" id="{9255DFBE-19DA-408D-84E6-F4043FC30BD3}"/>
+              </a:ext>
+            </a:extLst>
+          </p:cNvPr>
+          <p:cNvSpPr>
+            <a:spLocks noGrp="1"/>
+          </p:cNvSpPr>
+          <p:nvPr>
+            <p:ph type="ctrTitle"/>
           </p:nvPr>
         </p:nvSpPr>
         <p:spPr/>
         <p:txBody>
-          <a:bodyPr/>
+          <a:bodyPr>
+            <a:normAutofit/>
+          </a:bodyPr>
           <a:lstStyle/>
           <a:p>
             <a:r>
-              <a:rPr lang="en-US" b="1" dirty="0">
+              <a:rPr lang="en-US" sz="4800" b="1" dirty="0">
                 <a:solidFill>
                   <a:srgbClr val="292D33"/>
                 </a:solidFill>
                 <a:latin typeface="Euclid Circular B" panose="020B0504000000000000" pitchFamily="34" charset="0"/>
                 <a:ea typeface="Euclid Circular B" panose="020B0504000000000000" pitchFamily="34" charset="0"/>
               </a:rPr>
-              <a:t>Title</a:t>
-            </a:r>
-            <a:endParaRPr lang="en-US" dirty="0">
-              <a:solidFill>
-                <a:srgbClr val="292D33"/>
-              </a:solidFill>
-              <a:latin typeface="Euclid Circular B" panose="020B0504000000000000" pitchFamily="34" charset="0"/>
-              <a:ea typeface="Euclid Circular B" panose="020B0504000000000000" pitchFamily="34" charset="0"/>
-            </a:endParaRPr>
-          </a:p>
-        </p:txBody>
-      </p:sp>
-      <p:sp>
-        <p:nvSpPr>
-          <p:cNvPr id="3" name="Content Placeholder 2">
-            <a:extLst>
-              <a:ext uri="{FF2B5EF4-FFF2-40B4-BE49-F238E27FC236}">
-                <a16:creationId xmlns:a16="http://schemas.microsoft.com/office/drawing/2014/main" id="{891C7693-D3DF-4635-96F4-97F3B4136FDF}"/>
-              </a:ext>
-            </a:extLst>
-          </p:cNvPr>
-          <p:cNvSpPr>
-            <a:spLocks noGrp="1"/>
-          </p:cNvSpPr>
-          <p:nvPr>
-            <p:ph idx="1"/>
-          </p:nvPr>
-        </p:nvSpPr>
-        <p:spPr/>
-        <p:txBody>
-          <a:bodyPr/>
-          <a:lstStyle/>
-          <a:p>
-            <a:r>
-              <a:rPr lang="en-US" dirty="0">
-                <a:latin typeface="Euclid Circular B" panose="020B0504000000000000" pitchFamily="34" charset="0"/>
-                <a:ea typeface="Euclid Circular B" panose="020B0504000000000000" pitchFamily="34" charset="0"/>
-              </a:rPr>
-              <a:t>TODO: ...</a:t>
+              <a:t>EVENTHUB</a:t>
             </a:r>
           </a:p>
         </p:txBody>
@@ -6384,7 +7527,7 @@
     </p:spTree>
     <p:extLst>
       <p:ext uri="{BB962C8B-B14F-4D97-AF65-F5344CB8AC3E}">
-        <p14:creationId xmlns:p14="http://schemas.microsoft.com/office/powerpoint/2010/main" val="1699722907"/>
+        <p14:creationId xmlns:p14="http://schemas.microsoft.com/office/powerpoint/2010/main" val="1208906816"/>
       </p:ext>
     </p:extLst>
   </p:cSld>
@@ -6454,7 +7597,7 @@
                 <a:latin typeface="Euclid Circular B" panose="020B0504000000000000" pitchFamily="34" charset="0"/>
                 <a:ea typeface="Euclid Circular B" panose="020B0504000000000000" pitchFamily="34" charset="0"/>
               </a:rPr>
-              <a:t>Title</a:t>
+              <a:t>EventHub</a:t>
             </a:r>
             <a:endParaRPr lang="en-US" dirty="0">
               <a:solidFill>
@@ -6492,32 +7635,210 @@
                 <a:latin typeface="Euclid Circular B" panose="020B0504000000000000" pitchFamily="34" charset="0"/>
                 <a:ea typeface="Euclid Circular B" panose="020B0504000000000000" pitchFamily="34" charset="0"/>
               </a:rPr>
-              <a:t>TODO</a:t>
-            </a:r>
-            <a:r>
-              <a:rPr lang="en-US">
-                <a:latin typeface="Euclid Circular B" panose="020B0504000000000000" pitchFamily="34" charset="0"/>
-                <a:ea typeface="Euclid Circular B" panose="020B0504000000000000" pitchFamily="34" charset="0"/>
-              </a:rPr>
-              <a:t>: ...</a:t>
-            </a:r>
-            <a:endParaRPr lang="en-US" dirty="0">
-              <a:latin typeface="Euclid Circular B" panose="020B0504000000000000" pitchFamily="34" charset="0"/>
-              <a:ea typeface="Euclid Circular B" panose="020B0504000000000000" pitchFamily="34" charset="0"/>
-            </a:endParaRPr>
+              <a:t>A </a:t>
+            </a:r>
+            <a:r>
+              <a:rPr lang="en-US" b="1" dirty="0">
+                <a:latin typeface="Euclid Circular B" panose="020B0504000000000000" pitchFamily="34" charset="0"/>
+                <a:ea typeface="Euclid Circular B" panose="020B0504000000000000" pitchFamily="34" charset="0"/>
+              </a:rPr>
+              <a:t>reference application</a:t>
+            </a:r>
+            <a:r>
+              <a:rPr lang="en-US" dirty="0">
+                <a:latin typeface="Euclid Circular B" panose="020B0504000000000000" pitchFamily="34" charset="0"/>
+                <a:ea typeface="Euclid Circular B" panose="020B0504000000000000" pitchFamily="34" charset="0"/>
+              </a:rPr>
+              <a:t> for implementing DDD.</a:t>
+            </a:r>
+          </a:p>
+          <a:p>
+            <a:r>
+              <a:rPr lang="en-US" dirty="0">
+                <a:latin typeface="Euclid Circular B" panose="020B0504000000000000" pitchFamily="34" charset="0"/>
+                <a:ea typeface="Euclid Circular B" panose="020B0504000000000000" pitchFamily="34" charset="0"/>
+              </a:rPr>
+              <a:t>Explained in the </a:t>
+            </a:r>
+            <a:r>
+              <a:rPr lang="en-US" b="1" dirty="0">
+                <a:latin typeface="Euclid Circular B" panose="020B0504000000000000" pitchFamily="34" charset="0"/>
+                <a:ea typeface="Euclid Circular B" panose="020B0504000000000000" pitchFamily="34" charset="0"/>
+              </a:rPr>
+              <a:t>Mastering ABP Framework</a:t>
+            </a:r>
+            <a:r>
+              <a:rPr lang="en-US" dirty="0">
+                <a:latin typeface="Euclid Circular B" panose="020B0504000000000000" pitchFamily="34" charset="0"/>
+                <a:ea typeface="Euclid Circular B" panose="020B0504000000000000" pitchFamily="34" charset="0"/>
+              </a:rPr>
+              <a:t> book.</a:t>
+            </a:r>
           </a:p>
         </p:txBody>
       </p:sp>
     </p:spTree>
     <p:extLst>
       <p:ext uri="{BB962C8B-B14F-4D97-AF65-F5344CB8AC3E}">
-        <p14:creationId xmlns:p14="http://schemas.microsoft.com/office/powerpoint/2010/main" val="2800787200"/>
+        <p14:creationId xmlns:p14="http://schemas.microsoft.com/office/powerpoint/2010/main" val="988782490"/>
       </p:ext>
     </p:extLst>
   </p:cSld>
   <p:clrMapOvr>
     <a:masterClrMapping/>
   </p:clrMapOvr>
+  <p:timing>
+    <p:tnLst>
+      <p:par>
+        <p:cTn id="1" dur="indefinite" restart="never" nodeType="tmRoot">
+          <p:childTnLst>
+            <p:seq concurrent="1" nextAc="seek">
+              <p:cTn id="2" dur="indefinite" nodeType="mainSeq">
+                <p:childTnLst>
+                  <p:par>
+                    <p:cTn id="3" fill="hold">
+                      <p:stCondLst>
+                        <p:cond delay="indefinite"/>
+                      </p:stCondLst>
+                      <p:childTnLst>
+                        <p:par>
+                          <p:cTn id="4" fill="hold">
+                            <p:stCondLst>
+                              <p:cond delay="0"/>
+                            </p:stCondLst>
+                            <p:childTnLst>
+                              <p:par>
+                                <p:cTn id="5" presetID="10" presetClass="entr" presetSubtype="0" fill="hold" nodeType="clickEffect">
+                                  <p:stCondLst>
+                                    <p:cond delay="0"/>
+                                  </p:stCondLst>
+                                  <p:childTnLst>
+                                    <p:set>
+                                      <p:cBhvr>
+                                        <p:cTn id="6" dur="1" fill="hold">
+                                          <p:stCondLst>
+                                            <p:cond delay="0"/>
+                                          </p:stCondLst>
+                                        </p:cTn>
+                                        <p:tgtEl>
+                                          <p:spTgt spid="3">
+                                            <p:txEl>
+                                              <p:pRg st="0" end="0"/>
+                                            </p:txEl>
+                                          </p:spTgt>
+                                        </p:tgtEl>
+                                        <p:attrNameLst>
+                                          <p:attrName>style.visibility</p:attrName>
+                                        </p:attrNameLst>
+                                      </p:cBhvr>
+                                      <p:to>
+                                        <p:strVal val="visible"/>
+                                      </p:to>
+                                    </p:set>
+                                    <p:animEffect transition="in" filter="fade">
+                                      <p:cBhvr>
+                                        <p:cTn id="7" dur="500"/>
+                                        <p:tgtEl>
+                                          <p:spTgt spid="3">
+                                            <p:txEl>
+                                              <p:pRg st="0" end="0"/>
+                                            </p:txEl>
+                                          </p:spTgt>
+                                        </p:tgtEl>
+                                      </p:cBhvr>
+                                    </p:animEffect>
+                                  </p:childTnLst>
+                                </p:cTn>
+                              </p:par>
+                            </p:childTnLst>
+                          </p:cTn>
+                        </p:par>
+                      </p:childTnLst>
+                    </p:cTn>
+                  </p:par>
+                  <p:par>
+                    <p:cTn id="8" fill="hold">
+                      <p:stCondLst>
+                        <p:cond delay="indefinite"/>
+                      </p:stCondLst>
+                      <p:childTnLst>
+                        <p:par>
+                          <p:cTn id="9" fill="hold">
+                            <p:stCondLst>
+                              <p:cond delay="0"/>
+                            </p:stCondLst>
+                            <p:childTnLst>
+                              <p:par>
+                                <p:cTn id="10" presetID="10" presetClass="entr" presetSubtype="0" fill="hold" nodeType="clickEffect">
+                                  <p:stCondLst>
+                                    <p:cond delay="0"/>
+                                  </p:stCondLst>
+                                  <p:childTnLst>
+                                    <p:set>
+                                      <p:cBhvr>
+                                        <p:cTn id="11" dur="1" fill="hold">
+                                          <p:stCondLst>
+                                            <p:cond delay="0"/>
+                                          </p:stCondLst>
+                                        </p:cTn>
+                                        <p:tgtEl>
+                                          <p:spTgt spid="3">
+                                            <p:txEl>
+                                              <p:pRg st="1" end="1"/>
+                                            </p:txEl>
+                                          </p:spTgt>
+                                        </p:tgtEl>
+                                        <p:attrNameLst>
+                                          <p:attrName>style.visibility</p:attrName>
+                                        </p:attrNameLst>
+                                      </p:cBhvr>
+                                      <p:to>
+                                        <p:strVal val="visible"/>
+                                      </p:to>
+                                    </p:set>
+                                    <p:animEffect transition="in" filter="fade">
+                                      <p:cBhvr>
+                                        <p:cTn id="12" dur="500"/>
+                                        <p:tgtEl>
+                                          <p:spTgt spid="3">
+                                            <p:txEl>
+                                              <p:pRg st="1" end="1"/>
+                                            </p:txEl>
+                                          </p:spTgt>
+                                        </p:tgtEl>
+                                      </p:cBhvr>
+                                    </p:animEffect>
+                                  </p:childTnLst>
+                                </p:cTn>
+                              </p:par>
+                            </p:childTnLst>
+                          </p:cTn>
+                        </p:par>
+                      </p:childTnLst>
+                    </p:cTn>
+                  </p:par>
+                </p:childTnLst>
+              </p:cTn>
+              <p:prevCondLst>
+                <p:cond evt="onPrev" delay="0">
+                  <p:tgtEl>
+                    <p:sldTgt/>
+                  </p:tgtEl>
+                </p:cond>
+              </p:prevCondLst>
+              <p:nextCondLst>
+                <p:cond evt="onNext" delay="0">
+                  <p:tgtEl>
+                    <p:sldTgt/>
+                  </p:tgtEl>
+                </p:cond>
+              </p:nextCondLst>
+            </p:seq>
+          </p:childTnLst>
+        </p:cTn>
+      </p:par>
+    </p:tnLst>
+  </p:timing>
 </p:sld>
 </file>
 

</xml_diff>